<commit_message>
big o slide updates
</commit_message>
<xml_diff>
--- a/ClassMaterials/BigO/Slides/Part1-BigO.pptx
+++ b/ClassMaterials/BigO/Slides/Part1-BigO.pptx
@@ -5,10 +5,10 @@
     <p:sldMasterId id="2147484539" r:id="rId4"/>
   </p:sldMasterIdLst>
   <p:notesMasterIdLst>
-    <p:notesMasterId r:id="rId19"/>
+    <p:notesMasterId r:id="rId20"/>
   </p:notesMasterIdLst>
   <p:handoutMasterIdLst>
-    <p:handoutMasterId r:id="rId20"/>
+    <p:handoutMasterId r:id="rId21"/>
   </p:handoutMasterIdLst>
   <p:sldIdLst>
     <p:sldId id="256" r:id="rId5"/>
@@ -25,6 +25,7 @@
     <p:sldId id="332" r:id="rId16"/>
     <p:sldId id="366" r:id="rId17"/>
     <p:sldId id="364" r:id="rId18"/>
+    <p:sldId id="367" r:id="rId19"/>
   </p:sldIdLst>
   <p:sldSz cx="9144000" cy="6858000" type="screen4x3"/>
   <p:notesSz cx="6881813" cy="9296400"/>
@@ -175,6 +176,30 @@
 <file path=ppt/changesInfos/changesInfo1.xml><?xml version="1.0" encoding="utf-8"?>
 <pc:chgInfo xmlns:a="http://schemas.openxmlformats.org/drawingml/2006/main" xmlns:r="http://schemas.openxmlformats.org/officeDocument/2006/relationships" xmlns:ac="http://schemas.microsoft.com/office/drawing/2013/main/command" xmlns:pc="http://schemas.microsoft.com/office/powerpoint/2013/main/command">
   <pc:docChgLst>
+    <pc:chgData name="Dorsey, Cameron" userId="S::dorseycs@rose-hulman.edu::e3fdc538-7733-41a8-91e6-3ff377dfa323" providerId="AD" clId="Web-{29D5D553-C42C-4041-8BB7-F1E6BAFE8D12}"/>
+    <pc:docChg chg="modSld">
+      <pc:chgData name="Dorsey, Cameron" userId="S::dorseycs@rose-hulman.edu::e3fdc538-7733-41a8-91e6-3ff377dfa323" providerId="AD" clId="Web-{29D5D553-C42C-4041-8BB7-F1E6BAFE8D12}" dt="2021-11-02T12:25:50.238" v="1"/>
+      <pc:docMkLst>
+        <pc:docMk/>
+      </pc:docMkLst>
+      <pc:sldChg chg="delSp modSp">
+        <pc:chgData name="Dorsey, Cameron" userId="S::dorseycs@rose-hulman.edu::e3fdc538-7733-41a8-91e6-3ff377dfa323" providerId="AD" clId="Web-{29D5D553-C42C-4041-8BB7-F1E6BAFE8D12}" dt="2021-11-02T12:25:50.238" v="1"/>
+        <pc:sldMkLst>
+          <pc:docMk/>
+          <pc:sldMk cId="0" sldId="278"/>
+        </pc:sldMkLst>
+        <pc:spChg chg="del mod">
+          <ac:chgData name="Dorsey, Cameron" userId="S::dorseycs@rose-hulman.edu::e3fdc538-7733-41a8-91e6-3ff377dfa323" providerId="AD" clId="Web-{29D5D553-C42C-4041-8BB7-F1E6BAFE8D12}" dt="2021-11-02T12:25:50.238" v="1"/>
+          <ac:spMkLst>
+            <pc:docMk/>
+            <pc:sldMk cId="0" sldId="278"/>
+            <ac:spMk id="2" creationId="{18637EA3-8563-4792-A86F-A5C7A598F122}"/>
+          </ac:spMkLst>
+        </pc:spChg>
+      </pc:sldChg>
+    </pc:docChg>
+  </pc:docChgLst>
+  <pc:docChgLst>
     <pc:chgData name="Yoder, Jason" userId="28f4d4d8-da04-4f86-b14d-a21675737bc5" providerId="ADAL" clId="{E891FAB1-693C-42E5-BFA2-2F5DF8A46FAE}"/>
     <pc:docChg chg="modSld">
       <pc:chgData name="Yoder, Jason" userId="28f4d4d8-da04-4f86-b14d-a21675737bc5" providerId="ADAL" clId="{E891FAB1-693C-42E5-BFA2-2F5DF8A46FAE}" dt="2023-10-31T11:58:19.459" v="137" actId="113"/>
@@ -209,6 +234,54 @@
           <pc:docMk/>
           <pc:sldMk cId="2954348014" sldId="365"/>
         </pc:sldMkLst>
+      </pc:sldChg>
+    </pc:docChg>
+  </pc:docChgLst>
+  <pc:docChgLst>
+    <pc:chgData name="Korinek, Adam" userId="S::korineaj@rose-hulman.edu::a98ddd77-be9c-4186-9ea9-5e52026b75b2" providerId="AD" clId="Web-{3082B386-A943-42BE-8EE5-2C5B84113876}"/>
+    <pc:docChg chg="modSld">
+      <pc:chgData name="Korinek, Adam" userId="S::korineaj@rose-hulman.edu::a98ddd77-be9c-4186-9ea9-5e52026b75b2" providerId="AD" clId="Web-{3082B386-A943-42BE-8EE5-2C5B84113876}" dt="2021-11-02T12:02:33.003" v="0"/>
+      <pc:docMkLst>
+        <pc:docMk/>
+      </pc:docMkLst>
+      <pc:sldChg chg="addSp">
+        <pc:chgData name="Korinek, Adam" userId="S::korineaj@rose-hulman.edu::a98ddd77-be9c-4186-9ea9-5e52026b75b2" providerId="AD" clId="Web-{3082B386-A943-42BE-8EE5-2C5B84113876}" dt="2021-11-02T12:02:33.003" v="0"/>
+        <pc:sldMkLst>
+          <pc:docMk/>
+          <pc:sldMk cId="0" sldId="278"/>
+        </pc:sldMkLst>
+        <pc:spChg chg="add">
+          <ac:chgData name="Korinek, Adam" userId="S::korineaj@rose-hulman.edu::a98ddd77-be9c-4186-9ea9-5e52026b75b2" providerId="AD" clId="Web-{3082B386-A943-42BE-8EE5-2C5B84113876}" dt="2021-11-02T12:02:33.003" v="0"/>
+          <ac:spMkLst>
+            <pc:docMk/>
+            <pc:sldMk cId="0" sldId="278"/>
+            <ac:spMk id="2" creationId="{18637EA3-8563-4792-A86F-A5C7A598F122}"/>
+          </ac:spMkLst>
+        </pc:spChg>
+      </pc:sldChg>
+    </pc:docChg>
+  </pc:docChgLst>
+  <pc:docChgLst>
+    <pc:chgData name="Hennarty, Scott" userId="S::hennarsp@rose-hulman.edu::a365ec00-508c-495a-ae9c-ff7392d7b284" providerId="AD" clId="Web-{0D3EE1FC-0B8D-40E6-859A-AFEDA1F14614}"/>
+    <pc:docChg chg="modSld">
+      <pc:chgData name="Hennarty, Scott" userId="S::hennarsp@rose-hulman.edu::a365ec00-508c-495a-ae9c-ff7392d7b284" providerId="AD" clId="Web-{0D3EE1FC-0B8D-40E6-859A-AFEDA1F14614}" dt="2021-11-17T03:59:28.003" v="4" actId="14100"/>
+      <pc:docMkLst>
+        <pc:docMk/>
+      </pc:docMkLst>
+      <pc:sldChg chg="modSp">
+        <pc:chgData name="Hennarty, Scott" userId="S::hennarsp@rose-hulman.edu::a365ec00-508c-495a-ae9c-ff7392d7b284" providerId="AD" clId="Web-{0D3EE1FC-0B8D-40E6-859A-AFEDA1F14614}" dt="2021-11-17T03:59:28.003" v="4" actId="14100"/>
+        <pc:sldMkLst>
+          <pc:docMk/>
+          <pc:sldMk cId="3025574630" sldId="320"/>
+        </pc:sldMkLst>
+        <pc:spChg chg="mod">
+          <ac:chgData name="Hennarty, Scott" userId="S::hennarsp@rose-hulman.edu::a365ec00-508c-495a-ae9c-ff7392d7b284" providerId="AD" clId="Web-{0D3EE1FC-0B8D-40E6-859A-AFEDA1F14614}" dt="2021-11-17T03:59:28.003" v="4" actId="14100"/>
+          <ac:spMkLst>
+            <pc:docMk/>
+            <pc:sldMk cId="3025574630" sldId="320"/>
+            <ac:spMk id="2" creationId="{00000000-0000-0000-0000-000000000000}"/>
+          </ac:spMkLst>
+        </pc:spChg>
       </pc:sldChg>
     </pc:docChg>
   </pc:docChgLst>
@@ -357,78 +430,6 @@
       </pc:sldChg>
     </pc:docChg>
   </pc:docChgLst>
-  <pc:docChgLst>
-    <pc:chgData name="Hennarty, Scott" userId="S::hennarsp@rose-hulman.edu::a365ec00-508c-495a-ae9c-ff7392d7b284" providerId="AD" clId="Web-{0D3EE1FC-0B8D-40E6-859A-AFEDA1F14614}"/>
-    <pc:docChg chg="modSld">
-      <pc:chgData name="Hennarty, Scott" userId="S::hennarsp@rose-hulman.edu::a365ec00-508c-495a-ae9c-ff7392d7b284" providerId="AD" clId="Web-{0D3EE1FC-0B8D-40E6-859A-AFEDA1F14614}" dt="2021-11-17T03:59:28.003" v="4" actId="14100"/>
-      <pc:docMkLst>
-        <pc:docMk/>
-      </pc:docMkLst>
-      <pc:sldChg chg="modSp">
-        <pc:chgData name="Hennarty, Scott" userId="S::hennarsp@rose-hulman.edu::a365ec00-508c-495a-ae9c-ff7392d7b284" providerId="AD" clId="Web-{0D3EE1FC-0B8D-40E6-859A-AFEDA1F14614}" dt="2021-11-17T03:59:28.003" v="4" actId="14100"/>
-        <pc:sldMkLst>
-          <pc:docMk/>
-          <pc:sldMk cId="3025574630" sldId="320"/>
-        </pc:sldMkLst>
-        <pc:spChg chg="mod">
-          <ac:chgData name="Hennarty, Scott" userId="S::hennarsp@rose-hulman.edu::a365ec00-508c-495a-ae9c-ff7392d7b284" providerId="AD" clId="Web-{0D3EE1FC-0B8D-40E6-859A-AFEDA1F14614}" dt="2021-11-17T03:59:28.003" v="4" actId="14100"/>
-          <ac:spMkLst>
-            <pc:docMk/>
-            <pc:sldMk cId="3025574630" sldId="320"/>
-            <ac:spMk id="2" creationId="{00000000-0000-0000-0000-000000000000}"/>
-          </ac:spMkLst>
-        </pc:spChg>
-      </pc:sldChg>
-    </pc:docChg>
-  </pc:docChgLst>
-  <pc:docChgLst>
-    <pc:chgData name="Dorsey, Cameron" userId="S::dorseycs@rose-hulman.edu::e3fdc538-7733-41a8-91e6-3ff377dfa323" providerId="AD" clId="Web-{29D5D553-C42C-4041-8BB7-F1E6BAFE8D12}"/>
-    <pc:docChg chg="modSld">
-      <pc:chgData name="Dorsey, Cameron" userId="S::dorseycs@rose-hulman.edu::e3fdc538-7733-41a8-91e6-3ff377dfa323" providerId="AD" clId="Web-{29D5D553-C42C-4041-8BB7-F1E6BAFE8D12}" dt="2021-11-02T12:25:50.238" v="1"/>
-      <pc:docMkLst>
-        <pc:docMk/>
-      </pc:docMkLst>
-      <pc:sldChg chg="delSp modSp">
-        <pc:chgData name="Dorsey, Cameron" userId="S::dorseycs@rose-hulman.edu::e3fdc538-7733-41a8-91e6-3ff377dfa323" providerId="AD" clId="Web-{29D5D553-C42C-4041-8BB7-F1E6BAFE8D12}" dt="2021-11-02T12:25:50.238" v="1"/>
-        <pc:sldMkLst>
-          <pc:docMk/>
-          <pc:sldMk cId="0" sldId="278"/>
-        </pc:sldMkLst>
-        <pc:spChg chg="del mod">
-          <ac:chgData name="Dorsey, Cameron" userId="S::dorseycs@rose-hulman.edu::e3fdc538-7733-41a8-91e6-3ff377dfa323" providerId="AD" clId="Web-{29D5D553-C42C-4041-8BB7-F1E6BAFE8D12}" dt="2021-11-02T12:25:50.238" v="1"/>
-          <ac:spMkLst>
-            <pc:docMk/>
-            <pc:sldMk cId="0" sldId="278"/>
-            <ac:spMk id="2" creationId="{18637EA3-8563-4792-A86F-A5C7A598F122}"/>
-          </ac:spMkLst>
-        </pc:spChg>
-      </pc:sldChg>
-    </pc:docChg>
-  </pc:docChgLst>
-  <pc:docChgLst>
-    <pc:chgData name="Korinek, Adam" userId="S::korineaj@rose-hulman.edu::a98ddd77-be9c-4186-9ea9-5e52026b75b2" providerId="AD" clId="Web-{3082B386-A943-42BE-8EE5-2C5B84113876}"/>
-    <pc:docChg chg="modSld">
-      <pc:chgData name="Korinek, Adam" userId="S::korineaj@rose-hulman.edu::a98ddd77-be9c-4186-9ea9-5e52026b75b2" providerId="AD" clId="Web-{3082B386-A943-42BE-8EE5-2C5B84113876}" dt="2021-11-02T12:02:33.003" v="0"/>
-      <pc:docMkLst>
-        <pc:docMk/>
-      </pc:docMkLst>
-      <pc:sldChg chg="addSp">
-        <pc:chgData name="Korinek, Adam" userId="S::korineaj@rose-hulman.edu::a98ddd77-be9c-4186-9ea9-5e52026b75b2" providerId="AD" clId="Web-{3082B386-A943-42BE-8EE5-2C5B84113876}" dt="2021-11-02T12:02:33.003" v="0"/>
-        <pc:sldMkLst>
-          <pc:docMk/>
-          <pc:sldMk cId="0" sldId="278"/>
-        </pc:sldMkLst>
-        <pc:spChg chg="add">
-          <ac:chgData name="Korinek, Adam" userId="S::korineaj@rose-hulman.edu::a98ddd77-be9c-4186-9ea9-5e52026b75b2" providerId="AD" clId="Web-{3082B386-A943-42BE-8EE5-2C5B84113876}" dt="2021-11-02T12:02:33.003" v="0"/>
-          <ac:spMkLst>
-            <pc:docMk/>
-            <pc:sldMk cId="0" sldId="278"/>
-            <ac:spMk id="2" creationId="{18637EA3-8563-4792-A86F-A5C7A598F122}"/>
-          </ac:spMkLst>
-        </pc:spChg>
-      </pc:sldChg>
-    </pc:docChg>
-  </pc:docChgLst>
 </pc:chgInfo>
 </file>
 
@@ -549,7 +550,7 @@
               <a:pPr>
                 <a:defRPr/>
               </a:pPr>
-              <a:t>11/20/2023</a:t>
+              <a:t>2/25/2024</a:t>
             </a:fld>
             <a:endParaRPr lang="en-US"/>
           </a:p>
@@ -784,7 +785,7 @@
               <a:pPr>
                 <a:defRPr/>
               </a:pPr>
-              <a:t>11/20/2023</a:t>
+              <a:t>2/25/2024</a:t>
             </a:fld>
             <a:endParaRPr lang="en-US"/>
           </a:p>
@@ -3056,7 +3057,7 @@
               <a:pPr>
                 <a:defRPr/>
               </a:pPr>
-              <a:t>Monday, November 20, 2023</a:t>
+              <a:t>Sunday, February 25, 2024</a:t>
             </a:fld>
             <a:endParaRPr lang="en-US"/>
           </a:p>
@@ -3239,7 +3240,7 @@
               <a:pPr>
                 <a:defRPr/>
               </a:pPr>
-              <a:t>Monday, November 20, 2023</a:t>
+              <a:t>Sunday, February 25, 2024</a:t>
             </a:fld>
             <a:endParaRPr lang="en-US"/>
           </a:p>
@@ -3432,7 +3433,7 @@
               <a:pPr>
                 <a:defRPr/>
               </a:pPr>
-              <a:t>Monday, November 20, 2023</a:t>
+              <a:t>Sunday, February 25, 2024</a:t>
             </a:fld>
             <a:endParaRPr lang="en-US"/>
           </a:p>
@@ -3615,7 +3616,7 @@
               <a:pPr>
                 <a:defRPr/>
               </a:pPr>
-              <a:t>Monday, November 20, 2023</a:t>
+              <a:t>Sunday, February 25, 2024</a:t>
             </a:fld>
             <a:endParaRPr lang="en-US"/>
           </a:p>
@@ -3875,7 +3876,7 @@
               <a:pPr>
                 <a:defRPr/>
               </a:pPr>
-              <a:t>Monday, November 20, 2023</a:t>
+              <a:t>Sunday, February 25, 2024</a:t>
             </a:fld>
             <a:endParaRPr lang="en-US"/>
           </a:p>
@@ -4175,7 +4176,7 @@
               <a:pPr>
                 <a:defRPr/>
               </a:pPr>
-              <a:t>Monday, November 20, 2023</a:t>
+              <a:t>Sunday, February 25, 2024</a:t>
             </a:fld>
             <a:endParaRPr lang="en-US"/>
           </a:p>
@@ -4609,7 +4610,7 @@
               <a:pPr>
                 <a:defRPr/>
               </a:pPr>
-              <a:t>Monday, November 20, 2023</a:t>
+              <a:t>Sunday, February 25, 2024</a:t>
             </a:fld>
             <a:endParaRPr lang="en-US"/>
           </a:p>
@@ -4741,7 +4742,7 @@
               <a:pPr>
                 <a:defRPr/>
               </a:pPr>
-              <a:t>Monday, November 20, 2023</a:t>
+              <a:t>Sunday, February 25, 2024</a:t>
             </a:fld>
             <a:endParaRPr lang="en-US"/>
           </a:p>
@@ -4851,7 +4852,7 @@
               <a:pPr>
                 <a:defRPr/>
               </a:pPr>
-              <a:t>Monday, November 20, 2023</a:t>
+              <a:t>Sunday, February 25, 2024</a:t>
             </a:fld>
             <a:endParaRPr lang="en-US"/>
           </a:p>
@@ -5141,7 +5142,7 @@
               <a:pPr>
                 <a:defRPr/>
               </a:pPr>
-              <a:t>Monday, November 20, 2023</a:t>
+              <a:t>Sunday, February 25, 2024</a:t>
             </a:fld>
             <a:endParaRPr lang="en-US"/>
           </a:p>
@@ -5408,7 +5409,7 @@
               <a:pPr>
                 <a:defRPr/>
               </a:pPr>
-              <a:t>Monday, November 20, 2023</a:t>
+              <a:t>Sunday, February 25, 2024</a:t>
             </a:fld>
             <a:endParaRPr lang="en-US"/>
           </a:p>
@@ -5634,7 +5635,7 @@
               <a:pPr>
                 <a:defRPr/>
               </a:pPr>
-              <a:t>Monday, November 20, 2023</a:t>
+              <a:t>Sunday, February 25, 2024</a:t>
             </a:fld>
             <a:endParaRPr lang="en-US"/>
           </a:p>
@@ -6207,8 +6208,8 @@
         </p:nvSpPr>
         <p:spPr>
           <a:xfrm>
-            <a:off x="3581400" y="-40807"/>
-            <a:ext cx="5334001" cy="1046440"/>
+            <a:off x="3025588" y="-40807"/>
+            <a:ext cx="5889813" cy="1046440"/>
           </a:xfrm>
           <a:prstGeom prst="rect">
             <a:avLst/>
@@ -6249,13 +6250,18 @@
           </a:p>
           <a:p>
             <a:r>
-              <a:rPr lang="en-US" sz="4400" dirty="0">
+              <a:rPr lang="en-US" sz="4400">
                 <a:highlight>
                   <a:srgbClr val="FFFF00"/>
                 </a:highlight>
               </a:rPr>
-              <a:t>__________</a:t>
-            </a:r>
+              <a:t>____________</a:t>
+            </a:r>
+            <a:endParaRPr lang="en-US" sz="4400" dirty="0">
+              <a:highlight>
+                <a:srgbClr val="FFFF00"/>
+              </a:highlight>
+            </a:endParaRPr>
           </a:p>
         </p:txBody>
       </p:sp>
@@ -7638,11 +7644,529 @@
           </a:fontRef>
         </p:style>
       </p:cxnSp>
+      <p:sp>
+        <p:nvSpPr>
+          <p:cNvPr id="4" name="TextBox 3">
+            <a:extLst>
+              <a:ext uri="{FF2B5EF4-FFF2-40B4-BE49-F238E27FC236}">
+                <a16:creationId xmlns:a16="http://schemas.microsoft.com/office/drawing/2014/main" id="{89430838-7F71-709F-1527-B708893D3AD3}"/>
+              </a:ext>
+            </a:extLst>
+          </p:cNvPr>
+          <p:cNvSpPr txBox="1"/>
+          <p:nvPr/>
+        </p:nvSpPr>
+        <p:spPr>
+          <a:xfrm>
+            <a:off x="5585255" y="1153382"/>
+            <a:ext cx="951470" cy="369332"/>
+          </a:xfrm>
+          <a:prstGeom prst="rect">
+            <a:avLst/>
+          </a:prstGeom>
+          <a:noFill/>
+        </p:spPr>
+        <p:txBody>
+          <a:bodyPr wrap="square" rtlCol="0">
+            <a:spAutoFit/>
+          </a:bodyPr>
+          <a:lstStyle/>
+          <a:p>
+            <a:r>
+              <a:rPr lang="en-US" dirty="0"/>
+              <a:t>O(1)</a:t>
+            </a:r>
+          </a:p>
+        </p:txBody>
+      </p:sp>
+      <p:sp>
+        <p:nvSpPr>
+          <p:cNvPr id="5" name="TextBox 4">
+            <a:extLst>
+              <a:ext uri="{FF2B5EF4-FFF2-40B4-BE49-F238E27FC236}">
+                <a16:creationId xmlns:a16="http://schemas.microsoft.com/office/drawing/2014/main" id="{BA30D50C-756B-1BF7-F7B9-DF40036F5B1D}"/>
+              </a:ext>
+            </a:extLst>
+          </p:cNvPr>
+          <p:cNvSpPr txBox="1"/>
+          <p:nvPr/>
+        </p:nvSpPr>
+        <p:spPr>
+          <a:xfrm>
+            <a:off x="5585255" y="1453173"/>
+            <a:ext cx="951470" cy="369332"/>
+          </a:xfrm>
+          <a:prstGeom prst="rect">
+            <a:avLst/>
+          </a:prstGeom>
+          <a:noFill/>
+        </p:spPr>
+        <p:txBody>
+          <a:bodyPr wrap="square" rtlCol="0">
+            <a:spAutoFit/>
+          </a:bodyPr>
+          <a:lstStyle/>
+          <a:p>
+            <a:r>
+              <a:rPr lang="en-US" dirty="0"/>
+              <a:t>O(1)</a:t>
+            </a:r>
+          </a:p>
+        </p:txBody>
+      </p:sp>
+      <p:sp>
+        <p:nvSpPr>
+          <p:cNvPr id="7" name="TextBox 6">
+            <a:extLst>
+              <a:ext uri="{FF2B5EF4-FFF2-40B4-BE49-F238E27FC236}">
+                <a16:creationId xmlns:a16="http://schemas.microsoft.com/office/drawing/2014/main" id="{454A4E53-57C3-60E1-5595-64CD4A2E17AE}"/>
+              </a:ext>
+            </a:extLst>
+          </p:cNvPr>
+          <p:cNvSpPr txBox="1"/>
+          <p:nvPr/>
+        </p:nvSpPr>
+        <p:spPr>
+          <a:xfrm>
+            <a:off x="5597955" y="1789390"/>
+            <a:ext cx="951470" cy="369332"/>
+          </a:xfrm>
+          <a:prstGeom prst="rect">
+            <a:avLst/>
+          </a:prstGeom>
+          <a:noFill/>
+        </p:spPr>
+        <p:txBody>
+          <a:bodyPr wrap="square" rtlCol="0">
+            <a:spAutoFit/>
+          </a:bodyPr>
+          <a:lstStyle/>
+          <a:p>
+            <a:r>
+              <a:rPr lang="en-US" dirty="0"/>
+              <a:t>O(1)</a:t>
+            </a:r>
+          </a:p>
+        </p:txBody>
+      </p:sp>
+      <p:sp>
+        <p:nvSpPr>
+          <p:cNvPr id="10" name="TextBox 9">
+            <a:extLst>
+              <a:ext uri="{FF2B5EF4-FFF2-40B4-BE49-F238E27FC236}">
+                <a16:creationId xmlns:a16="http://schemas.microsoft.com/office/drawing/2014/main" id="{108E89AE-3F8B-52A7-77F4-FD57AE1E3913}"/>
+              </a:ext>
+            </a:extLst>
+          </p:cNvPr>
+          <p:cNvSpPr txBox="1"/>
+          <p:nvPr/>
+        </p:nvSpPr>
+        <p:spPr>
+          <a:xfrm>
+            <a:off x="5585255" y="2111716"/>
+            <a:ext cx="951470" cy="369332"/>
+          </a:xfrm>
+          <a:prstGeom prst="rect">
+            <a:avLst/>
+          </a:prstGeom>
+          <a:noFill/>
+        </p:spPr>
+        <p:txBody>
+          <a:bodyPr wrap="square" rtlCol="0">
+            <a:spAutoFit/>
+          </a:bodyPr>
+          <a:lstStyle/>
+          <a:p>
+            <a:r>
+              <a:rPr lang="en-US" dirty="0"/>
+              <a:t>O(1)</a:t>
+            </a:r>
+          </a:p>
+        </p:txBody>
+      </p:sp>
+      <p:sp>
+        <p:nvSpPr>
+          <p:cNvPr id="11" name="TextBox 10">
+            <a:extLst>
+              <a:ext uri="{FF2B5EF4-FFF2-40B4-BE49-F238E27FC236}">
+                <a16:creationId xmlns:a16="http://schemas.microsoft.com/office/drawing/2014/main" id="{FE71388A-A78F-C135-A133-B2F0BEB012B5}"/>
+              </a:ext>
+            </a:extLst>
+          </p:cNvPr>
+          <p:cNvSpPr txBox="1"/>
+          <p:nvPr/>
+        </p:nvSpPr>
+        <p:spPr>
+          <a:xfrm>
+            <a:off x="5572555" y="2409409"/>
+            <a:ext cx="951470" cy="369332"/>
+          </a:xfrm>
+          <a:prstGeom prst="rect">
+            <a:avLst/>
+          </a:prstGeom>
+          <a:noFill/>
+        </p:spPr>
+        <p:txBody>
+          <a:bodyPr wrap="square" rtlCol="0">
+            <a:spAutoFit/>
+          </a:bodyPr>
+          <a:lstStyle/>
+          <a:p>
+            <a:r>
+              <a:rPr lang="en-US" dirty="0"/>
+              <a:t>O(1)</a:t>
+            </a:r>
+          </a:p>
+        </p:txBody>
+      </p:sp>
+      <p:sp>
+        <p:nvSpPr>
+          <p:cNvPr id="12" name="TextBox 11">
+            <a:extLst>
+              <a:ext uri="{FF2B5EF4-FFF2-40B4-BE49-F238E27FC236}">
+                <a16:creationId xmlns:a16="http://schemas.microsoft.com/office/drawing/2014/main" id="{03CE3DDE-B538-6B68-796B-E61D1E5B2AEA}"/>
+              </a:ext>
+            </a:extLst>
+          </p:cNvPr>
+          <p:cNvSpPr txBox="1"/>
+          <p:nvPr/>
+        </p:nvSpPr>
+        <p:spPr>
+          <a:xfrm>
+            <a:off x="5585255" y="2749144"/>
+            <a:ext cx="951470" cy="369332"/>
+          </a:xfrm>
+          <a:prstGeom prst="rect">
+            <a:avLst/>
+          </a:prstGeom>
+          <a:noFill/>
+        </p:spPr>
+        <p:txBody>
+          <a:bodyPr wrap="square" rtlCol="0">
+            <a:spAutoFit/>
+          </a:bodyPr>
+          <a:lstStyle/>
+          <a:p>
+            <a:r>
+              <a:rPr lang="en-US" dirty="0"/>
+              <a:t>O(N)</a:t>
+            </a:r>
+          </a:p>
+        </p:txBody>
+      </p:sp>
     </p:spTree>
   </p:cSld>
   <p:clrMapOvr>
     <a:masterClrMapping/>
   </p:clrMapOvr>
+  <p:timing>
+    <p:tnLst>
+      <p:par>
+        <p:cTn id="1" dur="indefinite" restart="never" nodeType="tmRoot">
+          <p:childTnLst>
+            <p:seq concurrent="1" nextAc="seek">
+              <p:cTn id="2" dur="indefinite" nodeType="mainSeq">
+                <p:childTnLst>
+                  <p:par>
+                    <p:cTn id="3" fill="hold">
+                      <p:stCondLst>
+                        <p:cond delay="indefinite"/>
+                      </p:stCondLst>
+                      <p:childTnLst>
+                        <p:par>
+                          <p:cTn id="4" fill="hold">
+                            <p:stCondLst>
+                              <p:cond delay="0"/>
+                            </p:stCondLst>
+                            <p:childTnLst>
+                              <p:par>
+                                <p:cTn id="5" presetID="1" presetClass="entr" presetSubtype="0" fill="hold" grpId="0" nodeType="clickEffect">
+                                  <p:stCondLst>
+                                    <p:cond delay="0"/>
+                                  </p:stCondLst>
+                                  <p:childTnLst>
+                                    <p:set>
+                                      <p:cBhvr>
+                                        <p:cTn id="6" dur="1" fill="hold">
+                                          <p:stCondLst>
+                                            <p:cond delay="0"/>
+                                          </p:stCondLst>
+                                        </p:cTn>
+                                        <p:tgtEl>
+                                          <p:spTgt spid="4"/>
+                                        </p:tgtEl>
+                                        <p:attrNameLst>
+                                          <p:attrName>style.visibility</p:attrName>
+                                        </p:attrNameLst>
+                                      </p:cBhvr>
+                                      <p:to>
+                                        <p:strVal val="visible"/>
+                                      </p:to>
+                                    </p:set>
+                                  </p:childTnLst>
+                                </p:cTn>
+                              </p:par>
+                            </p:childTnLst>
+                          </p:cTn>
+                        </p:par>
+                      </p:childTnLst>
+                    </p:cTn>
+                  </p:par>
+                  <p:par>
+                    <p:cTn id="7" fill="hold">
+                      <p:stCondLst>
+                        <p:cond delay="indefinite"/>
+                      </p:stCondLst>
+                      <p:childTnLst>
+                        <p:par>
+                          <p:cTn id="8" fill="hold">
+                            <p:stCondLst>
+                              <p:cond delay="0"/>
+                            </p:stCondLst>
+                            <p:childTnLst>
+                              <p:par>
+                                <p:cTn id="9" presetID="1" presetClass="entr" presetSubtype="0" fill="hold" grpId="0" nodeType="clickEffect">
+                                  <p:stCondLst>
+                                    <p:cond delay="0"/>
+                                  </p:stCondLst>
+                                  <p:childTnLst>
+                                    <p:set>
+                                      <p:cBhvr>
+                                        <p:cTn id="10" dur="1" fill="hold">
+                                          <p:stCondLst>
+                                            <p:cond delay="0"/>
+                                          </p:stCondLst>
+                                        </p:cTn>
+                                        <p:tgtEl>
+                                          <p:spTgt spid="5"/>
+                                        </p:tgtEl>
+                                        <p:attrNameLst>
+                                          <p:attrName>style.visibility</p:attrName>
+                                        </p:attrNameLst>
+                                      </p:cBhvr>
+                                      <p:to>
+                                        <p:strVal val="visible"/>
+                                      </p:to>
+                                    </p:set>
+                                  </p:childTnLst>
+                                </p:cTn>
+                              </p:par>
+                            </p:childTnLst>
+                          </p:cTn>
+                        </p:par>
+                      </p:childTnLst>
+                    </p:cTn>
+                  </p:par>
+                  <p:par>
+                    <p:cTn id="11" fill="hold">
+                      <p:stCondLst>
+                        <p:cond delay="indefinite"/>
+                      </p:stCondLst>
+                      <p:childTnLst>
+                        <p:par>
+                          <p:cTn id="12" fill="hold">
+                            <p:stCondLst>
+                              <p:cond delay="0"/>
+                            </p:stCondLst>
+                            <p:childTnLst>
+                              <p:par>
+                                <p:cTn id="13" presetID="1" presetClass="entr" presetSubtype="0" fill="hold" grpId="0" nodeType="clickEffect">
+                                  <p:stCondLst>
+                                    <p:cond delay="0"/>
+                                  </p:stCondLst>
+                                  <p:childTnLst>
+                                    <p:set>
+                                      <p:cBhvr>
+                                        <p:cTn id="14" dur="1" fill="hold">
+                                          <p:stCondLst>
+                                            <p:cond delay="0"/>
+                                          </p:stCondLst>
+                                        </p:cTn>
+                                        <p:tgtEl>
+                                          <p:spTgt spid="7"/>
+                                        </p:tgtEl>
+                                        <p:attrNameLst>
+                                          <p:attrName>style.visibility</p:attrName>
+                                        </p:attrNameLst>
+                                      </p:cBhvr>
+                                      <p:to>
+                                        <p:strVal val="visible"/>
+                                      </p:to>
+                                    </p:set>
+                                  </p:childTnLst>
+                                </p:cTn>
+                              </p:par>
+                            </p:childTnLst>
+                          </p:cTn>
+                        </p:par>
+                      </p:childTnLst>
+                    </p:cTn>
+                  </p:par>
+                  <p:par>
+                    <p:cTn id="15" fill="hold">
+                      <p:stCondLst>
+                        <p:cond delay="indefinite"/>
+                      </p:stCondLst>
+                      <p:childTnLst>
+                        <p:par>
+                          <p:cTn id="16" fill="hold">
+                            <p:stCondLst>
+                              <p:cond delay="0"/>
+                            </p:stCondLst>
+                            <p:childTnLst>
+                              <p:par>
+                                <p:cTn id="17" presetID="1" presetClass="entr" presetSubtype="0" fill="hold" grpId="0" nodeType="clickEffect">
+                                  <p:stCondLst>
+                                    <p:cond delay="0"/>
+                                  </p:stCondLst>
+                                  <p:childTnLst>
+                                    <p:set>
+                                      <p:cBhvr>
+                                        <p:cTn id="18" dur="1" fill="hold">
+                                          <p:stCondLst>
+                                            <p:cond delay="0"/>
+                                          </p:stCondLst>
+                                        </p:cTn>
+                                        <p:tgtEl>
+                                          <p:spTgt spid="10"/>
+                                        </p:tgtEl>
+                                        <p:attrNameLst>
+                                          <p:attrName>style.visibility</p:attrName>
+                                        </p:attrNameLst>
+                                      </p:cBhvr>
+                                      <p:to>
+                                        <p:strVal val="visible"/>
+                                      </p:to>
+                                    </p:set>
+                                  </p:childTnLst>
+                                </p:cTn>
+                              </p:par>
+                            </p:childTnLst>
+                          </p:cTn>
+                        </p:par>
+                      </p:childTnLst>
+                    </p:cTn>
+                  </p:par>
+                  <p:par>
+                    <p:cTn id="19" fill="hold">
+                      <p:stCondLst>
+                        <p:cond delay="indefinite"/>
+                      </p:stCondLst>
+                      <p:childTnLst>
+                        <p:par>
+                          <p:cTn id="20" fill="hold">
+                            <p:stCondLst>
+                              <p:cond delay="0"/>
+                            </p:stCondLst>
+                            <p:childTnLst>
+                              <p:par>
+                                <p:cTn id="21" presetID="1" presetClass="entr" presetSubtype="0" fill="hold" grpId="0" nodeType="clickEffect">
+                                  <p:stCondLst>
+                                    <p:cond delay="0"/>
+                                  </p:stCondLst>
+                                  <p:childTnLst>
+                                    <p:set>
+                                      <p:cBhvr>
+                                        <p:cTn id="22" dur="1" fill="hold">
+                                          <p:stCondLst>
+                                            <p:cond delay="0"/>
+                                          </p:stCondLst>
+                                        </p:cTn>
+                                        <p:tgtEl>
+                                          <p:spTgt spid="11"/>
+                                        </p:tgtEl>
+                                        <p:attrNameLst>
+                                          <p:attrName>style.visibility</p:attrName>
+                                        </p:attrNameLst>
+                                      </p:cBhvr>
+                                      <p:to>
+                                        <p:strVal val="visible"/>
+                                      </p:to>
+                                    </p:set>
+                                  </p:childTnLst>
+                                </p:cTn>
+                              </p:par>
+                            </p:childTnLst>
+                          </p:cTn>
+                        </p:par>
+                      </p:childTnLst>
+                    </p:cTn>
+                  </p:par>
+                  <p:par>
+                    <p:cTn id="23" fill="hold">
+                      <p:stCondLst>
+                        <p:cond delay="indefinite"/>
+                      </p:stCondLst>
+                      <p:childTnLst>
+                        <p:par>
+                          <p:cTn id="24" fill="hold">
+                            <p:stCondLst>
+                              <p:cond delay="0"/>
+                            </p:stCondLst>
+                            <p:childTnLst>
+                              <p:par>
+                                <p:cTn id="25" presetID="1" presetClass="entr" presetSubtype="0" fill="hold" grpId="0" nodeType="clickEffect">
+                                  <p:stCondLst>
+                                    <p:cond delay="0"/>
+                                  </p:stCondLst>
+                                  <p:childTnLst>
+                                    <p:set>
+                                      <p:cBhvr>
+                                        <p:cTn id="26" dur="1" fill="hold">
+                                          <p:stCondLst>
+                                            <p:cond delay="0"/>
+                                          </p:stCondLst>
+                                        </p:cTn>
+                                        <p:tgtEl>
+                                          <p:spTgt spid="12"/>
+                                        </p:tgtEl>
+                                        <p:attrNameLst>
+                                          <p:attrName>style.visibility</p:attrName>
+                                        </p:attrNameLst>
+                                      </p:cBhvr>
+                                      <p:to>
+                                        <p:strVal val="visible"/>
+                                      </p:to>
+                                    </p:set>
+                                  </p:childTnLst>
+                                </p:cTn>
+                              </p:par>
+                            </p:childTnLst>
+                          </p:cTn>
+                        </p:par>
+                      </p:childTnLst>
+                    </p:cTn>
+                  </p:par>
+                </p:childTnLst>
+              </p:cTn>
+              <p:prevCondLst>
+                <p:cond evt="onPrev" delay="0">
+                  <p:tgtEl>
+                    <p:sldTgt/>
+                  </p:tgtEl>
+                </p:cond>
+              </p:prevCondLst>
+              <p:nextCondLst>
+                <p:cond evt="onNext" delay="0">
+                  <p:tgtEl>
+                    <p:sldTgt/>
+                  </p:tgtEl>
+                </p:cond>
+              </p:nextCondLst>
+            </p:seq>
+          </p:childTnLst>
+        </p:cTn>
+      </p:par>
+    </p:tnLst>
+    <p:bldLst>
+      <p:bldP spid="4" grpId="0"/>
+      <p:bldP spid="5" grpId="0"/>
+      <p:bldP spid="7" grpId="0"/>
+      <p:bldP spid="10" grpId="0"/>
+      <p:bldP spid="11" grpId="0"/>
+      <p:bldP spid="12" grpId="0"/>
+    </p:bldLst>
+  </p:timing>
 </p:sld>
 </file>
 
@@ -7999,6 +8523,169 @@
     <p:extLst>
       <p:ext uri="{BB962C8B-B14F-4D97-AF65-F5344CB8AC3E}">
         <p14:creationId xmlns:p14="http://schemas.microsoft.com/office/powerpoint/2010/main" val="3800278728"/>
+      </p:ext>
+    </p:extLst>
+  </p:cSld>
+  <p:clrMapOvr>
+    <a:masterClrMapping/>
+  </p:clrMapOvr>
+</p:sld>
+</file>
+
+<file path=ppt/slides/slide15.xml><?xml version="1.0" encoding="utf-8"?>
+<p:sld xmlns:a="http://schemas.openxmlformats.org/drawingml/2006/main" xmlns:r="http://schemas.openxmlformats.org/officeDocument/2006/relationships" xmlns:p="http://schemas.openxmlformats.org/presentationml/2006/main">
+  <p:cSld>
+    <p:spTree>
+      <p:nvGrpSpPr>
+        <p:cNvPr id="1" name=""/>
+        <p:cNvGrpSpPr/>
+        <p:nvPr/>
+      </p:nvGrpSpPr>
+      <p:grpSpPr>
+        <a:xfrm>
+          <a:off x="0" y="0"/>
+          <a:ext cx="0" cy="0"/>
+          <a:chOff x="0" y="0"/>
+          <a:chExt cx="0" cy="0"/>
+        </a:xfrm>
+      </p:grpSpPr>
+      <p:sp>
+        <p:nvSpPr>
+          <p:cNvPr id="2" name="Title 1">
+            <a:extLst>
+              <a:ext uri="{FF2B5EF4-FFF2-40B4-BE49-F238E27FC236}">
+                <a16:creationId xmlns:a16="http://schemas.microsoft.com/office/drawing/2014/main" id="{8ECBC52F-096C-40BA-9B6A-B52D8829E177}"/>
+              </a:ext>
+            </a:extLst>
+          </p:cNvPr>
+          <p:cNvSpPr>
+            <a:spLocks noGrp="1"/>
+          </p:cNvSpPr>
+          <p:nvPr>
+            <p:ph type="title"/>
+          </p:nvPr>
+        </p:nvSpPr>
+        <p:spPr/>
+        <p:txBody>
+          <a:bodyPr/>
+          <a:lstStyle/>
+          <a:p>
+            <a:r>
+              <a:rPr lang="en-US" dirty="0"/>
+              <a:t>Extra Practice</a:t>
+            </a:r>
+          </a:p>
+        </p:txBody>
+      </p:sp>
+      <p:sp>
+        <p:nvSpPr>
+          <p:cNvPr id="3" name="Content Placeholder 2">
+            <a:extLst>
+              <a:ext uri="{FF2B5EF4-FFF2-40B4-BE49-F238E27FC236}">
+                <a16:creationId xmlns:a16="http://schemas.microsoft.com/office/drawing/2014/main" id="{B41859B3-83EF-72EB-675A-295D490BB4F5}"/>
+              </a:ext>
+            </a:extLst>
+          </p:cNvPr>
+          <p:cNvSpPr>
+            <a:spLocks noGrp="1"/>
+          </p:cNvSpPr>
+          <p:nvPr>
+            <p:ph idx="1"/>
+          </p:nvPr>
+        </p:nvSpPr>
+        <p:spPr>
+          <a:xfrm>
+            <a:off x="457200" y="1600201"/>
+            <a:ext cx="8229600" cy="1963270"/>
+          </a:xfrm>
+        </p:spPr>
+        <p:txBody>
+          <a:bodyPr/>
+          <a:lstStyle/>
+          <a:p>
+            <a:r>
+              <a:rPr lang="en-US" dirty="0"/>
+              <a:t>Good preparation for CSSE230</a:t>
+            </a:r>
+          </a:p>
+          <a:p>
+            <a:r>
+              <a:rPr lang="en-US" dirty="0"/>
+              <a:t>Good preparation for Final Exam Questions</a:t>
+            </a:r>
+          </a:p>
+          <a:p>
+            <a:r>
+              <a:rPr lang="en-US" dirty="0"/>
+              <a:t>Good way to confirm understanding of Big O</a:t>
+            </a:r>
+          </a:p>
+        </p:txBody>
+      </p:sp>
+      <p:pic>
+        <p:nvPicPr>
+          <p:cNvPr id="5" name="Picture 4">
+            <a:extLst>
+              <a:ext uri="{FF2B5EF4-FFF2-40B4-BE49-F238E27FC236}">
+                <a16:creationId xmlns:a16="http://schemas.microsoft.com/office/drawing/2014/main" id="{C34F9AB6-001F-7121-5F64-BA6EBDCF7F4D}"/>
+              </a:ext>
+            </a:extLst>
+          </p:cNvPr>
+          <p:cNvPicPr>
+            <a:picLocks noChangeAspect="1"/>
+          </p:cNvPicPr>
+          <p:nvPr/>
+        </p:nvPicPr>
+        <p:blipFill>
+          <a:blip r:embed="rId2"/>
+          <a:stretch>
+            <a:fillRect/>
+          </a:stretch>
+        </p:blipFill>
+        <p:spPr>
+          <a:xfrm>
+            <a:off x="134471" y="3931101"/>
+            <a:ext cx="4626114" cy="2149957"/>
+          </a:xfrm>
+          <a:prstGeom prst="rect">
+            <a:avLst/>
+          </a:prstGeom>
+        </p:spPr>
+      </p:pic>
+      <p:pic>
+        <p:nvPicPr>
+          <p:cNvPr id="9" name="Picture 8">
+            <a:extLst>
+              <a:ext uri="{FF2B5EF4-FFF2-40B4-BE49-F238E27FC236}">
+                <a16:creationId xmlns:a16="http://schemas.microsoft.com/office/drawing/2014/main" id="{A0087C8E-AF90-6024-AC05-24F13782528D}"/>
+              </a:ext>
+            </a:extLst>
+          </p:cNvPr>
+          <p:cNvPicPr>
+            <a:picLocks noChangeAspect="1"/>
+          </p:cNvPicPr>
+          <p:nvPr/>
+        </p:nvPicPr>
+        <p:blipFill>
+          <a:blip r:embed="rId3"/>
+          <a:stretch>
+            <a:fillRect/>
+          </a:stretch>
+        </p:blipFill>
+        <p:spPr>
+          <a:xfrm>
+            <a:off x="4146178" y="3916274"/>
+            <a:ext cx="4863351" cy="2164784"/>
+          </a:xfrm>
+          <a:prstGeom prst="rect">
+            <a:avLst/>
+          </a:prstGeom>
+        </p:spPr>
+      </p:pic>
+    </p:spTree>
+    <p:extLst>
+      <p:ext uri="{BB962C8B-B14F-4D97-AF65-F5344CB8AC3E}">
+        <p14:creationId xmlns:p14="http://schemas.microsoft.com/office/powerpoint/2010/main" val="2564781098"/>
       </p:ext>
     </p:extLst>
   </p:cSld>
@@ -10355,6 +11042,15 @@
 </file>
 
 <file path=customXml/item1.xml><?xml version="1.0" encoding="utf-8"?>
+<?mso-contentType ?>
+<FormTemplates xmlns="http://schemas.microsoft.com/sharepoint/v3/contenttype/forms">
+  <Display>DocumentLibraryForm</Display>
+  <Edit>DocumentLibraryForm</Edit>
+  <New>DocumentLibraryForm</New>
+</FormTemplates>
+</file>
+
+<file path=customXml/item2.xml><?xml version="1.0" encoding="utf-8"?>
 <ct:contentTypeSchema xmlns:ct="http://schemas.microsoft.com/office/2006/metadata/contentType" xmlns:ma="http://schemas.microsoft.com/office/2006/metadata/properties/metaAttributes" ct:_="" ma:_="" ma:contentTypeName="Document" ma:contentTypeID="0x0101004285D81DBE5F5A448E892B34D6B8CF20" ma:contentTypeVersion="8" ma:contentTypeDescription="Create a new document." ma:contentTypeScope="" ma:versionID="ecce54155d2ea7caa9aed06c8b6b9867">
   <xsd:schema xmlns:xsd="http://www.w3.org/2001/XMLSchema" xmlns:xs="http://www.w3.org/2001/XMLSchema" xmlns:p="http://schemas.microsoft.com/office/2006/metadata/properties" xmlns:ns2="08600313-7276-4ca7-b5d3-7d86193ee0ac" xmlns:ns3="820f9cb1-409d-4c4b-8197-1d4f7dd48124" targetNamespace="http://schemas.microsoft.com/office/2006/metadata/properties" ma:root="true" ma:fieldsID="bfd7385540b70b2fe84ac888cc214377" ns2:_="" ns3:_="">
     <xsd:import namespace="08600313-7276-4ca7-b5d3-7d86193ee0ac"/>
@@ -10531,7 +11227,7 @@
 </ct:contentTypeSchema>
 </file>
 
-<file path=customXml/item2.xml><?xml version="1.0" encoding="utf-8"?>
+<file path=customXml/item3.xml><?xml version="1.0" encoding="utf-8"?>
 <p:properties xmlns:p="http://schemas.microsoft.com/office/2006/metadata/properties" xmlns:xsi="http://www.w3.org/2001/XMLSchema-instance" xmlns:pc="http://schemas.microsoft.com/office/infopath/2007/PartnerControls">
   <documentManagement>
     <TaxCatchAll xmlns="820f9cb1-409d-4c4b-8197-1d4f7dd48124" xsi:nil="true"/>
@@ -10542,16 +11238,15 @@
 </p:properties>
 </file>
 
-<file path=customXml/item3.xml><?xml version="1.0" encoding="utf-8"?>
-<?mso-contentType ?>
-<FormTemplates xmlns="http://schemas.microsoft.com/sharepoint/v3/contenttype/forms">
-  <Display>DocumentLibraryForm</Display>
-  <Edit>DocumentLibraryForm</Edit>
-  <New>DocumentLibraryForm</New>
-</FormTemplates>
+<file path=customXml/itemProps1.xml><?xml version="1.0" encoding="utf-8"?>
+<ds:datastoreItem xmlns:ds="http://schemas.openxmlformats.org/officeDocument/2006/customXml" ds:itemID="{98DCB3DE-F7C6-4785-A90F-6E90B1E66F77}">
+  <ds:schemaRefs>
+    <ds:schemaRef ds:uri="http://schemas.microsoft.com/sharepoint/v3/contenttype/forms"/>
+  </ds:schemaRefs>
+</ds:datastoreItem>
 </file>
 
-<file path=customXml/itemProps1.xml><?xml version="1.0" encoding="utf-8"?>
+<file path=customXml/itemProps2.xml><?xml version="1.0" encoding="utf-8"?>
 <ds:datastoreItem xmlns:ds="http://schemas.openxmlformats.org/officeDocument/2006/customXml" ds:itemID="{90660FB9-6ABA-42D4-BFF1-B348CA6E0487}">
   <ds:schemaRefs>
     <ds:schemaRef ds:uri="http://schemas.microsoft.com/office/2006/metadata/contentType"/>
@@ -10570,7 +11265,7 @@
 </ds:datastoreItem>
 </file>
 
-<file path=customXml/itemProps2.xml><?xml version="1.0" encoding="utf-8"?>
+<file path=customXml/itemProps3.xml><?xml version="1.0" encoding="utf-8"?>
 <ds:datastoreItem xmlns:ds="http://schemas.openxmlformats.org/officeDocument/2006/customXml" ds:itemID="{C3D75956-5F37-4DA5-A33F-2343D2D10E6D}">
   <ds:schemaRefs>
     <ds:schemaRef ds:uri="http://schemas.microsoft.com/office/2006/metadata/properties"/>
@@ -10579,12 +11274,4 @@
     <ds:schemaRef ds:uri="08600313-7276-4ca7-b5d3-7d86193ee0ac"/>
   </ds:schemaRefs>
 </ds:datastoreItem>
-</file>
-
-<file path=customXml/itemProps3.xml><?xml version="1.0" encoding="utf-8"?>
-<ds:datastoreItem xmlns:ds="http://schemas.openxmlformats.org/officeDocument/2006/customXml" ds:itemID="{98DCB3DE-F7C6-4785-A90F-6E90B1E66F77}">
-  <ds:schemaRefs>
-    <ds:schemaRef ds:uri="http://schemas.microsoft.com/sharepoint/v3/contenttype/forms"/>
-  </ds:schemaRefs>
-</ds:datastoreItem>
 </file>
</xml_diff>

<commit_message>
making all slides reference the board instead of needing to modify to add a password
</commit_message>
<xml_diff>
--- a/ClassMaterials/BigO/Slides/Part1-BigO.pptx
+++ b/ClassMaterials/BigO/Slides/Part1-BigO.pptx
@@ -550,7 +550,7 @@
               <a:pPr>
                 <a:defRPr/>
               </a:pPr>
-              <a:t>2/25/2024</a:t>
+              <a:t>4/21/2025</a:t>
             </a:fld>
             <a:endParaRPr lang="en-US"/>
           </a:p>
@@ -785,7 +785,7 @@
               <a:pPr>
                 <a:defRPr/>
               </a:pPr>
-              <a:t>2/25/2024</a:t>
+              <a:t>4/21/2025</a:t>
             </a:fld>
             <a:endParaRPr lang="en-US"/>
           </a:p>
@@ -3057,7 +3057,7 @@
               <a:pPr>
                 <a:defRPr/>
               </a:pPr>
-              <a:t>Sunday, February 25, 2024</a:t>
+              <a:t>Monday, April 21, 2025</a:t>
             </a:fld>
             <a:endParaRPr lang="en-US"/>
           </a:p>
@@ -3240,7 +3240,7 @@
               <a:pPr>
                 <a:defRPr/>
               </a:pPr>
-              <a:t>Sunday, February 25, 2024</a:t>
+              <a:t>Monday, April 21, 2025</a:t>
             </a:fld>
             <a:endParaRPr lang="en-US"/>
           </a:p>
@@ -3433,7 +3433,7 @@
               <a:pPr>
                 <a:defRPr/>
               </a:pPr>
-              <a:t>Sunday, February 25, 2024</a:t>
+              <a:t>Monday, April 21, 2025</a:t>
             </a:fld>
             <a:endParaRPr lang="en-US"/>
           </a:p>
@@ -3616,7 +3616,7 @@
               <a:pPr>
                 <a:defRPr/>
               </a:pPr>
-              <a:t>Sunday, February 25, 2024</a:t>
+              <a:t>Monday, April 21, 2025</a:t>
             </a:fld>
             <a:endParaRPr lang="en-US"/>
           </a:p>
@@ -3876,7 +3876,7 @@
               <a:pPr>
                 <a:defRPr/>
               </a:pPr>
-              <a:t>Sunday, February 25, 2024</a:t>
+              <a:t>Monday, April 21, 2025</a:t>
             </a:fld>
             <a:endParaRPr lang="en-US"/>
           </a:p>
@@ -4176,7 +4176,7 @@
               <a:pPr>
                 <a:defRPr/>
               </a:pPr>
-              <a:t>Sunday, February 25, 2024</a:t>
+              <a:t>Monday, April 21, 2025</a:t>
             </a:fld>
             <a:endParaRPr lang="en-US"/>
           </a:p>
@@ -4610,7 +4610,7 @@
               <a:pPr>
                 <a:defRPr/>
               </a:pPr>
-              <a:t>Sunday, February 25, 2024</a:t>
+              <a:t>Monday, April 21, 2025</a:t>
             </a:fld>
             <a:endParaRPr lang="en-US"/>
           </a:p>
@@ -4742,7 +4742,7 @@
               <a:pPr>
                 <a:defRPr/>
               </a:pPr>
-              <a:t>Sunday, February 25, 2024</a:t>
+              <a:t>Monday, April 21, 2025</a:t>
             </a:fld>
             <a:endParaRPr lang="en-US"/>
           </a:p>
@@ -4852,7 +4852,7 @@
               <a:pPr>
                 <a:defRPr/>
               </a:pPr>
-              <a:t>Sunday, February 25, 2024</a:t>
+              <a:t>Monday, April 21, 2025</a:t>
             </a:fld>
             <a:endParaRPr lang="en-US"/>
           </a:p>
@@ -5142,7 +5142,7 @@
               <a:pPr>
                 <a:defRPr/>
               </a:pPr>
-              <a:t>Sunday, February 25, 2024</a:t>
+              <a:t>Monday, April 21, 2025</a:t>
             </a:fld>
             <a:endParaRPr lang="en-US"/>
           </a:p>
@@ -5409,7 +5409,7 @@
               <a:pPr>
                 <a:defRPr/>
               </a:pPr>
-              <a:t>Sunday, February 25, 2024</a:t>
+              <a:t>Monday, April 21, 2025</a:t>
             </a:fld>
             <a:endParaRPr lang="en-US"/>
           </a:p>
@@ -5635,7 +5635,7 @@
               <a:pPr>
                 <a:defRPr/>
               </a:pPr>
-              <a:t>Sunday, February 25, 2024</a:t>
+              <a:t>Monday, April 21, 2025</a:t>
             </a:fld>
             <a:endParaRPr lang="en-US"/>
           </a:p>
@@ -6194,77 +6194,6 @@
           </a:p>
         </p:txBody>
       </p:sp>
-      <p:sp>
-        <p:nvSpPr>
-          <p:cNvPr id="3" name="TextBox 2">
-            <a:extLst>
-              <a:ext uri="{FF2B5EF4-FFF2-40B4-BE49-F238E27FC236}">
-                <a16:creationId xmlns:a16="http://schemas.microsoft.com/office/drawing/2014/main" id="{FA06D3A8-96ED-7423-8309-0245DBB737C2}"/>
-              </a:ext>
-            </a:extLst>
-          </p:cNvPr>
-          <p:cNvSpPr txBox="1"/>
-          <p:nvPr/>
-        </p:nvSpPr>
-        <p:spPr>
-          <a:xfrm>
-            <a:off x="3025588" y="-40807"/>
-            <a:ext cx="5889813" cy="1046440"/>
-          </a:xfrm>
-          <a:prstGeom prst="rect">
-            <a:avLst/>
-          </a:prstGeom>
-          <a:noFill/>
-          <a:ln w="12700" cap="flat">
-            <a:noFill/>
-            <a:miter lim="400000"/>
-          </a:ln>
-          <a:effectLst/>
-        </p:spPr>
-        <p:style>
-          <a:lnRef idx="0">
-            <a:scrgbClr r="0" g="0" b="0"/>
-          </a:lnRef>
-          <a:fillRef idx="0">
-            <a:scrgbClr r="0" g="0" b="0"/>
-          </a:fillRef>
-          <a:effectRef idx="0">
-            <a:scrgbClr r="0" g="0" b="0"/>
-          </a:effectRef>
-          <a:fontRef idx="none"/>
-        </p:style>
-        <p:txBody>
-          <a:bodyPr wrap="square">
-            <a:spAutoFit/>
-          </a:bodyPr>
-          <a:lstStyle/>
-          <a:p>
-            <a:r>
-              <a:rPr lang="en-US" dirty="0">
-                <a:highlight>
-                  <a:srgbClr val="FFFF00"/>
-                </a:highlight>
-              </a:rPr>
-              <a:t>Today’s Attendance password</a:t>
-            </a:r>
-          </a:p>
-          <a:p>
-            <a:r>
-              <a:rPr lang="en-US" sz="4400">
-                <a:highlight>
-                  <a:srgbClr val="FFFF00"/>
-                </a:highlight>
-              </a:rPr>
-              <a:t>____________</a:t>
-            </a:r>
-            <a:endParaRPr lang="en-US" sz="4400" dirty="0">
-              <a:highlight>
-                <a:srgbClr val="FFFF00"/>
-              </a:highlight>
-            </a:endParaRPr>
-          </a:p>
-        </p:txBody>
-      </p:sp>
       <p:pic>
         <p:nvPicPr>
           <p:cNvPr id="4" name="Picture 3">
@@ -6295,6 +6224,69 @@
           </a:prstGeom>
         </p:spPr>
       </p:pic>
+      <p:sp>
+        <p:nvSpPr>
+          <p:cNvPr id="6" name="Shape 54">
+            <a:extLst>
+              <a:ext uri="{FF2B5EF4-FFF2-40B4-BE49-F238E27FC236}">
+                <a16:creationId xmlns:a16="http://schemas.microsoft.com/office/drawing/2014/main" id="{7498667A-B705-44BD-3756-66560EE5BF56}"/>
+              </a:ext>
+            </a:extLst>
+          </p:cNvPr>
+          <p:cNvSpPr/>
+          <p:nvPr/>
+        </p:nvSpPr>
+        <p:spPr>
+          <a:xfrm>
+            <a:off x="5539154" y="209686"/>
+            <a:ext cx="3346430" cy="738664"/>
+          </a:xfrm>
+          <a:prstGeom prst="rect">
+            <a:avLst/>
+          </a:prstGeom>
+          <a:solidFill>
+            <a:srgbClr val="9BBB59"/>
+          </a:solidFill>
+          <a:ln w="25400" cap="rnd">
+            <a:solidFill>
+              <a:srgbClr val="718841"/>
+            </a:solidFill>
+          </a:ln>
+          <a:extLst>
+            <a:ext uri="{C572A759-6A51-4108-AA02-DFA0A04FC94B}">
+              <ma14:wrappingTextBoxFlag xmlns:ma14="http://schemas.microsoft.com/office/mac/drawingml/2011/main" xmlns="" val="1"/>
+            </a:ext>
+          </a:extLst>
+        </p:spPr>
+        <p:txBody>
+          <a:bodyPr wrap="square" lIns="0" tIns="0" rIns="0" bIns="0">
+            <a:spAutoFit/>
+          </a:bodyPr>
+          <a:lstStyle/>
+          <a:p>
+            <a:pPr lvl="0"/>
+            <a:r>
+              <a:rPr lang="en-US" sz="2400" i="1" dirty="0">
+                <a:solidFill>
+                  <a:srgbClr val="FFFFFF"/>
+                </a:solidFill>
+              </a:rPr>
+              <a:t> Attendance password    </a:t>
+            </a:r>
+          </a:p>
+          <a:p>
+            <a:pPr lvl="0"/>
+            <a:r>
+              <a:rPr lang="en-US" sz="2400" i="1" dirty="0">
+                <a:solidFill>
+                  <a:srgbClr val="FFFFFF"/>
+                </a:solidFill>
+              </a:rPr>
+              <a:t> is written on the board</a:t>
+            </a:r>
+          </a:p>
+        </p:txBody>
+      </p:sp>
     </p:spTree>
   </p:cSld>
   <p:clrMapOvr>
@@ -11042,15 +11034,6 @@
 </file>
 
 <file path=customXml/item1.xml><?xml version="1.0" encoding="utf-8"?>
-<?mso-contentType ?>
-<FormTemplates xmlns="http://schemas.microsoft.com/sharepoint/v3/contenttype/forms">
-  <Display>DocumentLibraryForm</Display>
-  <Edit>DocumentLibraryForm</Edit>
-  <New>DocumentLibraryForm</New>
-</FormTemplates>
-</file>
-
-<file path=customXml/item2.xml><?xml version="1.0" encoding="utf-8"?>
 <ct:contentTypeSchema xmlns:ct="http://schemas.microsoft.com/office/2006/metadata/contentType" xmlns:ma="http://schemas.microsoft.com/office/2006/metadata/properties/metaAttributes" ct:_="" ma:_="" ma:contentTypeName="Document" ma:contentTypeID="0x0101004285D81DBE5F5A448E892B34D6B8CF20" ma:contentTypeVersion="8" ma:contentTypeDescription="Create a new document." ma:contentTypeScope="" ma:versionID="ecce54155d2ea7caa9aed06c8b6b9867">
   <xsd:schema xmlns:xsd="http://www.w3.org/2001/XMLSchema" xmlns:xs="http://www.w3.org/2001/XMLSchema" xmlns:p="http://schemas.microsoft.com/office/2006/metadata/properties" xmlns:ns2="08600313-7276-4ca7-b5d3-7d86193ee0ac" xmlns:ns3="820f9cb1-409d-4c4b-8197-1d4f7dd48124" targetNamespace="http://schemas.microsoft.com/office/2006/metadata/properties" ma:root="true" ma:fieldsID="bfd7385540b70b2fe84ac888cc214377" ns2:_="" ns3:_="">
     <xsd:import namespace="08600313-7276-4ca7-b5d3-7d86193ee0ac"/>
@@ -11227,6 +11210,15 @@
 </ct:contentTypeSchema>
 </file>
 
+<file path=customXml/item2.xml><?xml version="1.0" encoding="utf-8"?>
+<?mso-contentType ?>
+<FormTemplates xmlns="http://schemas.microsoft.com/sharepoint/v3/contenttype/forms">
+  <Display>DocumentLibraryForm</Display>
+  <Edit>DocumentLibraryForm</Edit>
+  <New>DocumentLibraryForm</New>
+</FormTemplates>
+</file>
+
 <file path=customXml/item3.xml><?xml version="1.0" encoding="utf-8"?>
 <p:properties xmlns:p="http://schemas.microsoft.com/office/2006/metadata/properties" xmlns:xsi="http://www.w3.org/2001/XMLSchema-instance" xmlns:pc="http://schemas.microsoft.com/office/infopath/2007/PartnerControls">
   <documentManagement>
@@ -11239,14 +11231,6 @@
 </file>
 
 <file path=customXml/itemProps1.xml><?xml version="1.0" encoding="utf-8"?>
-<ds:datastoreItem xmlns:ds="http://schemas.openxmlformats.org/officeDocument/2006/customXml" ds:itemID="{98DCB3DE-F7C6-4785-A90F-6E90B1E66F77}">
-  <ds:schemaRefs>
-    <ds:schemaRef ds:uri="http://schemas.microsoft.com/sharepoint/v3/contenttype/forms"/>
-  </ds:schemaRefs>
-</ds:datastoreItem>
-</file>
-
-<file path=customXml/itemProps2.xml><?xml version="1.0" encoding="utf-8"?>
 <ds:datastoreItem xmlns:ds="http://schemas.openxmlformats.org/officeDocument/2006/customXml" ds:itemID="{90660FB9-6ABA-42D4-BFF1-B348CA6E0487}">
   <ds:schemaRefs>
     <ds:schemaRef ds:uri="http://schemas.microsoft.com/office/2006/metadata/contentType"/>
@@ -11265,6 +11249,14 @@
 </ds:datastoreItem>
 </file>
 
+<file path=customXml/itemProps2.xml><?xml version="1.0" encoding="utf-8"?>
+<ds:datastoreItem xmlns:ds="http://schemas.openxmlformats.org/officeDocument/2006/customXml" ds:itemID="{98DCB3DE-F7C6-4785-A90F-6E90B1E66F77}">
+  <ds:schemaRefs>
+    <ds:schemaRef ds:uri="http://schemas.microsoft.com/sharepoint/v3/contenttype/forms"/>
+  </ds:schemaRefs>
+</ds:datastoreItem>
+</file>
+
 <file path=customXml/itemProps3.xml><?xml version="1.0" encoding="utf-8"?>
 <ds:datastoreItem xmlns:ds="http://schemas.openxmlformats.org/officeDocument/2006/customXml" ds:itemID="{C3D75956-5F37-4DA5-A33F-2343D2D10E6D}">
   <ds:schemaRefs>

</xml_diff>